<commit_message>
Update Standup Meeting 1 Presentation.pptx
</commit_message>
<xml_diff>
--- a/Standup Meeting 1 Presentation.pptx
+++ b/Standup Meeting 1 Presentation.pptx
@@ -5,10 +5,10 @@
     <p:sldMasterId id="2147483648" r:id="rId4"/>
   </p:sldMasterIdLst>
   <p:notesMasterIdLst>
-    <p:notesMasterId r:id="rId19"/>
+    <p:notesMasterId r:id="rId18"/>
   </p:notesMasterIdLst>
   <p:handoutMasterIdLst>
-    <p:handoutMasterId r:id="rId20"/>
+    <p:handoutMasterId r:id="rId19"/>
   </p:handoutMasterIdLst>
   <p:sldIdLst>
     <p:sldId id="256" r:id="rId5"/>
@@ -21,10 +21,9 @@
     <p:sldId id="268" r:id="rId12"/>
     <p:sldId id="269" r:id="rId13"/>
     <p:sldId id="272" r:id="rId14"/>
-    <p:sldId id="263" r:id="rId15"/>
-    <p:sldId id="274" r:id="rId16"/>
-    <p:sldId id="275" r:id="rId17"/>
-    <p:sldId id="276" r:id="rId18"/>
+    <p:sldId id="274" r:id="rId15"/>
+    <p:sldId id="275" r:id="rId16"/>
+    <p:sldId id="276" r:id="rId17"/>
   </p:sldIdLst>
   <p:sldSz cx="12192000" cy="6858000"/>
   <p:notesSz cx="6858000" cy="9144000"/>
@@ -4302,150 +4301,6 @@
 </p:notes>
 </file>
 
-<file path=ppt/notesSlides/notesSlide2.xml><?xml version="1.0" encoding="utf-8"?>
-<p:notes xmlns:a="http://schemas.openxmlformats.org/drawingml/2006/main" xmlns:r="http://schemas.openxmlformats.org/officeDocument/2006/relationships" xmlns:p="http://schemas.openxmlformats.org/presentationml/2006/main">
-  <p:cSld>
-    <p:spTree>
-      <p:nvGrpSpPr>
-        <p:cNvPr id="1" name=""/>
-        <p:cNvGrpSpPr/>
-        <p:nvPr/>
-      </p:nvGrpSpPr>
-      <p:grpSpPr>
-        <a:xfrm>
-          <a:off x="0" y="0"/>
-          <a:ext cx="0" cy="0"/>
-          <a:chOff x="0" y="0"/>
-          <a:chExt cx="0" cy="0"/>
-        </a:xfrm>
-      </p:grpSpPr>
-      <p:sp>
-        <p:nvSpPr>
-          <p:cNvPr id="2" name="Slide Image Placeholder 1"/>
-          <p:cNvSpPr>
-            <a:spLocks noGrp="1" noRot="1" noChangeAspect="1"/>
-          </p:cNvSpPr>
-          <p:nvPr>
-            <p:ph type="sldImg"/>
-          </p:nvPr>
-        </p:nvSpPr>
-        <p:spPr/>
-      </p:sp>
-      <p:sp>
-        <p:nvSpPr>
-          <p:cNvPr id="3" name="Notes Placeholder 2"/>
-          <p:cNvSpPr>
-            <a:spLocks noGrp="1"/>
-          </p:cNvSpPr>
-          <p:nvPr>
-            <p:ph type="body" idx="1"/>
-          </p:nvPr>
-        </p:nvSpPr>
-        <p:spPr/>
-        <p:txBody>
-          <a:bodyPr/>
-          <a:lstStyle/>
-          <a:p>
-            <a:endParaRPr lang="en-US" dirty="0"/>
-          </a:p>
-        </p:txBody>
-      </p:sp>
-      <p:sp>
-        <p:nvSpPr>
-          <p:cNvPr id="4" name="Slide Number Placeholder 3"/>
-          <p:cNvSpPr>
-            <a:spLocks noGrp="1"/>
-          </p:cNvSpPr>
-          <p:nvPr>
-            <p:ph type="sldNum" sz="quarter" idx="5"/>
-          </p:nvPr>
-        </p:nvSpPr>
-        <p:spPr/>
-        <p:txBody>
-          <a:bodyPr/>
-          <a:lstStyle/>
-          <a:p>
-            <a:pPr marL="0" marR="0" lvl="0" indent="0" algn="r" defTabSz="914400" rtl="0" eaLnBrk="1" fontAlgn="auto" latinLnBrk="0" hangingPunct="1">
-              <a:lnSpc>
-                <a:spcPct val="100000"/>
-              </a:lnSpc>
-              <a:spcBef>
-                <a:spcPts val="0"/>
-              </a:spcBef>
-              <a:spcAft>
-                <a:spcPts val="0"/>
-              </a:spcAft>
-              <a:buClrTx/>
-              <a:buSzTx/>
-              <a:buFontTx/>
-              <a:buNone/>
-              <a:tabLst/>
-              <a:defRPr/>
-            </a:pPr>
-            <a:fld id="{12E1B3B4-A5A9-442E-B305-2C1B61528B9D}" type="slidenum">
-              <a:rPr kumimoji="0" lang="en-US" sz="1200" b="0" i="0" u="none" strike="noStrike" kern="1200" cap="none" spc="0" normalizeH="0" baseline="0" noProof="0" smtClean="0">
-                <a:ln>
-                  <a:noFill/>
-                </a:ln>
-                <a:solidFill>
-                  <a:prstClr val="black"/>
-                </a:solidFill>
-                <a:effectLst/>
-                <a:uLnTx/>
-                <a:uFillTx/>
-                <a:latin typeface="Calibri" panose="020F0502020204030204"/>
-                <a:ea typeface="+mn-ea"/>
-                <a:cs typeface="+mn-cs"/>
-              </a:rPr>
-              <a:pPr marL="0" marR="0" lvl="0" indent="0" algn="r" defTabSz="914400" rtl="0" eaLnBrk="1" fontAlgn="auto" latinLnBrk="0" hangingPunct="1">
-                <a:lnSpc>
-                  <a:spcPct val="100000"/>
-                </a:lnSpc>
-                <a:spcBef>
-                  <a:spcPts val="0"/>
-                </a:spcBef>
-                <a:spcAft>
-                  <a:spcPts val="0"/>
-                </a:spcAft>
-                <a:buClrTx/>
-                <a:buSzTx/>
-                <a:buFontTx/>
-                <a:buNone/>
-                <a:tabLst/>
-                <a:defRPr/>
-              </a:pPr>
-              <a:t>11</a:t>
-            </a:fld>
-            <a:endParaRPr kumimoji="0" lang="en-US" sz="1200" b="0" i="0" u="none" strike="noStrike" kern="1200" cap="none" spc="0" normalizeH="0" baseline="0" noProof="0" dirty="0">
-              <a:ln>
-                <a:noFill/>
-              </a:ln>
-              <a:solidFill>
-                <a:prstClr val="black"/>
-              </a:solidFill>
-              <a:effectLst/>
-              <a:uLnTx/>
-              <a:uFillTx/>
-              <a:latin typeface="Calibri" panose="020F0502020204030204"/>
-              <a:ea typeface="+mn-ea"/>
-              <a:cs typeface="+mn-cs"/>
-            </a:endParaRPr>
-          </a:p>
-        </p:txBody>
-      </p:sp>
-    </p:spTree>
-    <p:extLst>
-      <p:ext uri="{BB962C8B-B14F-4D97-AF65-F5344CB8AC3E}">
-        <p14:creationId xmlns:p14="http://schemas.microsoft.com/office/powerpoint/2010/main" val="533555847"/>
-      </p:ext>
-    </p:extLst>
-  </p:cSld>
-  <p:clrMapOvr>
-    <a:masterClrMapping/>
-  </p:clrMapOvr>
-</p:notes>
-</file>
-
 <file path=ppt/slideLayouts/slideLayout1.xml><?xml version="1.0" encoding="utf-8"?>
 <p:sldLayout xmlns:a="http://schemas.openxmlformats.org/drawingml/2006/main" xmlns:r="http://schemas.openxmlformats.org/officeDocument/2006/relationships" xmlns:p="http://schemas.openxmlformats.org/presentationml/2006/main" preserve="1" userDrawn="1">
   <p:cSld name="Title">
@@ -11225,24 +11080,60 @@
       </p:grpSpPr>
       <p:sp>
         <p:nvSpPr>
-          <p:cNvPr id="10" name="Title 9">
-            <a:extLst>
-              <a:ext uri="{FF2B5EF4-FFF2-40B4-BE49-F238E27FC236}">
-                <a16:creationId xmlns:a16="http://schemas.microsoft.com/office/drawing/2014/main" id="{21C5EA2A-10BF-4B5E-ACC8-8A766A0949A6}"/>
-              </a:ext>
-            </a:extLst>
-          </p:cNvPr>
-          <p:cNvSpPr>
-            <a:spLocks noGrp="1"/>
-          </p:cNvSpPr>
-          <p:nvPr>
-            <p:ph type="ctrTitle"/>
-          </p:nvPr>
-        </p:nvSpPr>
-        <p:spPr>
-          <a:xfrm>
-            <a:off x="649045" y="753035"/>
-            <a:ext cx="5945393" cy="2366683"/>
+          <p:cNvPr id="41" name="Title 40">
+            <a:extLst>
+              <a:ext uri="{FF2B5EF4-FFF2-40B4-BE49-F238E27FC236}">
+                <a16:creationId xmlns:a16="http://schemas.microsoft.com/office/drawing/2014/main" id="{0622F47C-D986-4C50-BD14-2C1E537C27FB}"/>
+              </a:ext>
+            </a:extLst>
+          </p:cNvPr>
+          <p:cNvSpPr>
+            <a:spLocks noGrp="1"/>
+          </p:cNvSpPr>
+          <p:nvPr>
+            <p:ph type="title"/>
+          </p:nvPr>
+        </p:nvSpPr>
+        <p:spPr>
+          <a:xfrm>
+            <a:off x="1879600" y="183988"/>
+            <a:ext cx="9406372" cy="803380"/>
+          </a:xfrm>
+        </p:spPr>
+        <p:txBody>
+          <a:bodyPr>
+            <a:normAutofit fontScale="90000"/>
+          </a:bodyPr>
+          <a:lstStyle/>
+          <a:p>
+            <a:r>
+              <a:rPr lang="en-US"/>
+              <a:t>Additional content</a:t>
+            </a:r>
+            <a:endParaRPr lang="en-US" dirty="0"/>
+          </a:p>
+        </p:txBody>
+      </p:sp>
+      <p:sp>
+        <p:nvSpPr>
+          <p:cNvPr id="12" name="Text Placeholder 11">
+            <a:extLst>
+              <a:ext uri="{FF2B5EF4-FFF2-40B4-BE49-F238E27FC236}">
+                <a16:creationId xmlns:a16="http://schemas.microsoft.com/office/drawing/2014/main" id="{D05AC8F8-F459-42EB-AA23-F556AEDD721A}"/>
+              </a:ext>
+            </a:extLst>
+          </p:cNvPr>
+          <p:cNvSpPr>
+            <a:spLocks noGrp="1"/>
+          </p:cNvSpPr>
+          <p:nvPr>
+            <p:ph type="body" sz="quarter" idx="14"/>
+          </p:nvPr>
+        </p:nvSpPr>
+        <p:spPr>
+          <a:xfrm>
+            <a:off x="851300" y="1764193"/>
+            <a:ext cx="3327366" cy="597604"/>
           </a:xfrm>
         </p:spPr>
         <p:txBody>
@@ -11251,31 +11142,81 @@
           <a:p>
             <a:r>
               <a:rPr lang="en-US" dirty="0"/>
-              <a:t>Fantasy Baseball</a:t>
-            </a:r>
-          </a:p>
-        </p:txBody>
-      </p:sp>
-      <p:sp>
-        <p:nvSpPr>
-          <p:cNvPr id="12" name="Subtitle 11">
-            <a:extLst>
-              <a:ext uri="{FF2B5EF4-FFF2-40B4-BE49-F238E27FC236}">
-                <a16:creationId xmlns:a16="http://schemas.microsoft.com/office/drawing/2014/main" id="{AEAC0465-1751-47C8-9200-CF24EEB5E133}"/>
-              </a:ext>
-            </a:extLst>
-          </p:cNvPr>
-          <p:cNvSpPr>
-            <a:spLocks noGrp="1"/>
-          </p:cNvSpPr>
-          <p:nvPr>
-            <p:ph type="subTitle" idx="1"/>
-          </p:nvPr>
-        </p:nvSpPr>
-        <p:spPr>
-          <a:xfrm>
-            <a:off x="649045" y="3075868"/>
-            <a:ext cx="5945393" cy="1108335"/>
+              <a:t>Subtitle</a:t>
+            </a:r>
+          </a:p>
+        </p:txBody>
+      </p:sp>
+      <p:sp>
+        <p:nvSpPr>
+          <p:cNvPr id="11" name="Content Placeholder 10">
+            <a:extLst>
+              <a:ext uri="{FF2B5EF4-FFF2-40B4-BE49-F238E27FC236}">
+                <a16:creationId xmlns:a16="http://schemas.microsoft.com/office/drawing/2014/main" id="{DFFE8322-74A2-43C3-B71A-8DD6B2DC0DF8}"/>
+              </a:ext>
+            </a:extLst>
+          </p:cNvPr>
+          <p:cNvSpPr>
+            <a:spLocks noGrp="1"/>
+          </p:cNvSpPr>
+          <p:nvPr>
+            <p:ph type="body" sz="quarter" idx="19"/>
+          </p:nvPr>
+        </p:nvSpPr>
+        <p:spPr>
+          <a:xfrm>
+            <a:off x="851193" y="2374899"/>
+            <a:ext cx="3327366" cy="3485573"/>
+          </a:xfrm>
+        </p:spPr>
+        <p:txBody>
+          <a:bodyPr>
+            <a:normAutofit/>
+          </a:bodyPr>
+          <a:lstStyle/>
+          <a:p>
+            <a:pPr lvl="0"/>
+            <a:r>
+              <a:rPr lang="en-US" dirty="0"/>
+              <a:t>Add text, images, art, and videos. </a:t>
+            </a:r>
+          </a:p>
+          <a:p>
+            <a:pPr lvl="0"/>
+            <a:r>
+              <a:rPr lang="en-US" dirty="0"/>
+              <a:t>Add transitions, animations, and motion. </a:t>
+            </a:r>
+          </a:p>
+          <a:p>
+            <a:pPr lvl="0"/>
+            <a:r>
+              <a:rPr lang="en-US" dirty="0"/>
+              <a:t>Save to OneDrive, to get to your presentations from your computer, tablet, or phone. </a:t>
+            </a:r>
+          </a:p>
+        </p:txBody>
+      </p:sp>
+      <p:sp>
+        <p:nvSpPr>
+          <p:cNvPr id="16" name="Text Placeholder 15">
+            <a:extLst>
+              <a:ext uri="{FF2B5EF4-FFF2-40B4-BE49-F238E27FC236}">
+                <a16:creationId xmlns:a16="http://schemas.microsoft.com/office/drawing/2014/main" id="{88417E53-E35C-4BA6-B238-61D2C004A237}"/>
+              </a:ext>
+            </a:extLst>
+          </p:cNvPr>
+          <p:cNvSpPr>
+            <a:spLocks noGrp="1"/>
+          </p:cNvSpPr>
+          <p:nvPr>
+            <p:ph type="body" sz="quarter" idx="18"/>
+          </p:nvPr>
+        </p:nvSpPr>
+        <p:spPr>
+          <a:xfrm>
+            <a:off x="4432317" y="1764193"/>
+            <a:ext cx="3327366" cy="597604"/>
           </a:xfrm>
         </p:spPr>
         <p:txBody>
@@ -11291,10 +11232,125 @@
       </p:sp>
       <p:sp>
         <p:nvSpPr>
-          <p:cNvPr id="3" name="Footer Placeholder 2">
-            <a:extLst>
-              <a:ext uri="{FF2B5EF4-FFF2-40B4-BE49-F238E27FC236}">
-                <a16:creationId xmlns:a16="http://schemas.microsoft.com/office/drawing/2014/main" id="{E5932065-5BEE-4D45-A3A1-6F0559B48650}"/>
+          <p:cNvPr id="13" name="Content Placeholder 12">
+            <a:extLst>
+              <a:ext uri="{FF2B5EF4-FFF2-40B4-BE49-F238E27FC236}">
+                <a16:creationId xmlns:a16="http://schemas.microsoft.com/office/drawing/2014/main" id="{32AA922F-7FCE-49A0-92E0-60263B0E006A}"/>
+              </a:ext>
+            </a:extLst>
+          </p:cNvPr>
+          <p:cNvSpPr>
+            <a:spLocks noGrp="1"/>
+          </p:cNvSpPr>
+          <p:nvPr>
+            <p:ph type="body" sz="quarter" idx="20"/>
+          </p:nvPr>
+        </p:nvSpPr>
+        <p:spPr>
+          <a:xfrm>
+            <a:off x="4432317" y="2374899"/>
+            <a:ext cx="3327366" cy="3485573"/>
+          </a:xfrm>
+        </p:spPr>
+        <p:txBody>
+          <a:bodyPr>
+            <a:normAutofit/>
+          </a:bodyPr>
+          <a:lstStyle/>
+          <a:p>
+            <a:r>
+              <a:rPr lang="en-US" dirty="0"/>
+              <a:t>This PowerPoint theme uses its own unique set of colors, fonts, and effects to create the overall look and feel of these slides. </a:t>
+            </a:r>
+          </a:p>
+          <a:p>
+            <a:r>
+              <a:rPr lang="en-US" dirty="0"/>
+              <a:t>PowerPoint has tons of themes to give your presentation just the right personality. </a:t>
+            </a:r>
+          </a:p>
+        </p:txBody>
+      </p:sp>
+      <p:sp>
+        <p:nvSpPr>
+          <p:cNvPr id="14" name="Text Placeholder 13">
+            <a:extLst>
+              <a:ext uri="{FF2B5EF4-FFF2-40B4-BE49-F238E27FC236}">
+                <a16:creationId xmlns:a16="http://schemas.microsoft.com/office/drawing/2014/main" id="{94D68F73-4FB1-4145-BF89-FE36142E5100}"/>
+              </a:ext>
+            </a:extLst>
+          </p:cNvPr>
+          <p:cNvSpPr>
+            <a:spLocks noGrp="1"/>
+          </p:cNvSpPr>
+          <p:nvPr>
+            <p:ph type="body" sz="quarter" idx="16"/>
+          </p:nvPr>
+        </p:nvSpPr>
+        <p:spPr>
+          <a:xfrm>
+            <a:off x="8025393" y="1764193"/>
+            <a:ext cx="3327366" cy="597604"/>
+          </a:xfrm>
+        </p:spPr>
+        <p:txBody>
+          <a:bodyPr/>
+          <a:lstStyle/>
+          <a:p>
+            <a:r>
+              <a:rPr lang="en-US" dirty="0"/>
+              <a:t>Subtitle</a:t>
+            </a:r>
+          </a:p>
+        </p:txBody>
+      </p:sp>
+      <p:sp>
+        <p:nvSpPr>
+          <p:cNvPr id="15" name="Content Placeholder 14">
+            <a:extLst>
+              <a:ext uri="{FF2B5EF4-FFF2-40B4-BE49-F238E27FC236}">
+                <a16:creationId xmlns:a16="http://schemas.microsoft.com/office/drawing/2014/main" id="{967F3EB6-BBF7-400D-831B-2949763446D0}"/>
+              </a:ext>
+            </a:extLst>
+          </p:cNvPr>
+          <p:cNvSpPr>
+            <a:spLocks noGrp="1"/>
+          </p:cNvSpPr>
+          <p:nvPr>
+            <p:ph type="body" sz="quarter" idx="21"/>
+          </p:nvPr>
+        </p:nvSpPr>
+        <p:spPr>
+          <a:xfrm>
+            <a:off x="8025393" y="2374899"/>
+            <a:ext cx="3327366" cy="3485573"/>
+          </a:xfrm>
+        </p:spPr>
+        <p:txBody>
+          <a:bodyPr>
+            <a:normAutofit/>
+          </a:bodyPr>
+          <a:lstStyle/>
+          <a:p>
+            <a:r>
+              <a:rPr lang="en-US" dirty="0"/>
+              <a:t>Open the Design Ideas pane for instant slide makeovers. </a:t>
+            </a:r>
+          </a:p>
+          <a:p>
+            <a:r>
+              <a:rPr lang="en-US" dirty="0"/>
+              <a:t>When we have design ideas, we’ll show them to you right there.</a:t>
+            </a:r>
+          </a:p>
+        </p:txBody>
+      </p:sp>
+      <p:sp>
+        <p:nvSpPr>
+          <p:cNvPr id="2" name="Footer Placeholder 1">
+            <a:extLst>
+              <a:ext uri="{FF2B5EF4-FFF2-40B4-BE49-F238E27FC236}">
+                <a16:creationId xmlns:a16="http://schemas.microsoft.com/office/drawing/2014/main" id="{2C20C49D-5E38-4E7C-A240-4B2D015F3AC7}"/>
               </a:ext>
             </a:extLst>
           </p:cNvPr>
@@ -11325,10 +11381,10 @@
       </p:sp>
       <p:sp>
         <p:nvSpPr>
-          <p:cNvPr id="2" name="Date Placeholder 1">
-            <a:extLst>
-              <a:ext uri="{FF2B5EF4-FFF2-40B4-BE49-F238E27FC236}">
-                <a16:creationId xmlns:a16="http://schemas.microsoft.com/office/drawing/2014/main" id="{B8D2C1D6-521E-4B36-BBF3-F3613BE0A718}"/>
+          <p:cNvPr id="3" name="Date Placeholder 2">
+            <a:extLst>
+              <a:ext uri="{FF2B5EF4-FFF2-40B4-BE49-F238E27FC236}">
+                <a16:creationId xmlns:a16="http://schemas.microsoft.com/office/drawing/2014/main" id="{9CE6D34A-9686-45B2-97D0-AD20167B2D54}"/>
               </a:ext>
             </a:extLst>
           </p:cNvPr>
@@ -11349,8 +11405,9 @@
           <a:bodyPr/>
           <a:lstStyle/>
           <a:p>
-            <a:r>
-              <a:rPr lang="en-US" dirty="0"/>
+            <a:pPr lvl="0"/>
+            <a:r>
+              <a:rPr lang="en-US" noProof="0" dirty="0"/>
               <a:t>20XX</a:t>
             </a:r>
           </a:p>
@@ -11361,7 +11418,7 @@
           <p:cNvPr id="4" name="Slide Number Placeholder 3">
             <a:extLst>
               <a:ext uri="{FF2B5EF4-FFF2-40B4-BE49-F238E27FC236}">
-                <a16:creationId xmlns:a16="http://schemas.microsoft.com/office/drawing/2014/main" id="{7CCC3E1D-B7F8-47F6-A352-B757462BBBA7}"/>
+                <a16:creationId xmlns:a16="http://schemas.microsoft.com/office/drawing/2014/main" id="{AC0EC6D8-4D66-4B16-AD3F-2850D613518A}"/>
               </a:ext>
             </a:extLst>
           </p:cNvPr>
@@ -11383,7 +11440,7 @@
           <a:lstStyle/>
           <a:p>
             <a:pPr lvl="0"/>
-            <a:fld id="{2722F022-211C-4882-844C-086FEA6806AA}" type="slidenum">
+            <a:fld id="{06B786C7-B8F9-4072-AAAA-17258464D730}" type="slidenum">
               <a:rPr lang="en-US" noProof="0" smtClean="0"/>
               <a:pPr lvl="0"/>
               <a:t>11</a:t>
@@ -11392,64 +11449,10 @@
           </a:p>
         </p:txBody>
       </p:sp>
-      <p:sp>
-        <p:nvSpPr>
-          <p:cNvPr id="6" name="Picture Placeholder 5">
-            <a:extLst>
-              <a:ext uri="{FF2B5EF4-FFF2-40B4-BE49-F238E27FC236}">
-                <a16:creationId xmlns:a16="http://schemas.microsoft.com/office/drawing/2014/main" id="{3B82755E-5175-6C53-9B38-E1A914873360}"/>
-              </a:ext>
-            </a:extLst>
-          </p:cNvPr>
-          <p:cNvSpPr>
-            <a:spLocks noGrp="1"/>
-          </p:cNvSpPr>
-          <p:nvPr>
-            <p:ph type="pic" sz="quarter" idx="13"/>
-          </p:nvPr>
-        </p:nvSpPr>
-        <p:spPr/>
-      </p:sp>
-      <p:sp>
-        <p:nvSpPr>
-          <p:cNvPr id="8" name="Picture Placeholder 7">
-            <a:extLst>
-              <a:ext uri="{FF2B5EF4-FFF2-40B4-BE49-F238E27FC236}">
-                <a16:creationId xmlns:a16="http://schemas.microsoft.com/office/drawing/2014/main" id="{59451C2B-9B45-4C65-33D7-0448AA495D8E}"/>
-              </a:ext>
-            </a:extLst>
-          </p:cNvPr>
-          <p:cNvSpPr>
-            <a:spLocks noGrp="1"/>
-          </p:cNvSpPr>
-          <p:nvPr>
-            <p:ph type="pic" sz="quarter" idx="14"/>
-          </p:nvPr>
-        </p:nvSpPr>
-        <p:spPr/>
-      </p:sp>
-      <p:sp>
-        <p:nvSpPr>
-          <p:cNvPr id="11" name="Picture Placeholder 10">
-            <a:extLst>
-              <a:ext uri="{FF2B5EF4-FFF2-40B4-BE49-F238E27FC236}">
-                <a16:creationId xmlns:a16="http://schemas.microsoft.com/office/drawing/2014/main" id="{92E49ED1-1BC4-5F3F-CB94-B8739E7E8461}"/>
-              </a:ext>
-            </a:extLst>
-          </p:cNvPr>
-          <p:cNvSpPr>
-            <a:spLocks noGrp="1"/>
-          </p:cNvSpPr>
-          <p:nvPr>
-            <p:ph type="pic" sz="quarter" idx="15"/>
-          </p:nvPr>
-        </p:nvSpPr>
-        <p:spPr/>
-      </p:sp>
     </p:spTree>
     <p:extLst>
       <p:ext uri="{BB962C8B-B14F-4D97-AF65-F5344CB8AC3E}">
-        <p14:creationId xmlns:p14="http://schemas.microsoft.com/office/powerpoint/2010/main" val="2826028905"/>
+        <p14:creationId xmlns:p14="http://schemas.microsoft.com/office/powerpoint/2010/main" val="338249949"/>
       </p:ext>
     </p:extLst>
   </p:cSld>
@@ -11478,10 +11481,10 @@
       </p:grpSpPr>
       <p:sp>
         <p:nvSpPr>
-          <p:cNvPr id="41" name="Title 40">
-            <a:extLst>
-              <a:ext uri="{FF2B5EF4-FFF2-40B4-BE49-F238E27FC236}">
-                <a16:creationId xmlns:a16="http://schemas.microsoft.com/office/drawing/2014/main" id="{0622F47C-D986-4C50-BD14-2C1E537C27FB}"/>
+          <p:cNvPr id="9" name="Title 8">
+            <a:extLst>
+              <a:ext uri="{FF2B5EF4-FFF2-40B4-BE49-F238E27FC236}">
+                <a16:creationId xmlns:a16="http://schemas.microsoft.com/office/drawing/2014/main" id="{9A92E93D-8BFB-4A21-A47E-78B6DCA21146}"/>
               </a:ext>
             </a:extLst>
           </p:cNvPr>
@@ -11494,44 +11497,8 @@
         </p:nvSpPr>
         <p:spPr>
           <a:xfrm>
-            <a:off x="1879600" y="183988"/>
-            <a:ext cx="9406372" cy="803380"/>
-          </a:xfrm>
-        </p:spPr>
-        <p:txBody>
-          <a:bodyPr>
-            <a:normAutofit fontScale="90000"/>
-          </a:bodyPr>
-          <a:lstStyle/>
-          <a:p>
-            <a:r>
-              <a:rPr lang="en-US"/>
-              <a:t>Additional content</a:t>
-            </a:r>
-            <a:endParaRPr lang="en-US" dirty="0"/>
-          </a:p>
-        </p:txBody>
-      </p:sp>
-      <p:sp>
-        <p:nvSpPr>
-          <p:cNvPr id="12" name="Text Placeholder 11">
-            <a:extLst>
-              <a:ext uri="{FF2B5EF4-FFF2-40B4-BE49-F238E27FC236}">
-                <a16:creationId xmlns:a16="http://schemas.microsoft.com/office/drawing/2014/main" id="{D05AC8F8-F459-42EB-AA23-F556AEDD721A}"/>
-              </a:ext>
-            </a:extLst>
-          </p:cNvPr>
-          <p:cNvSpPr>
-            <a:spLocks noGrp="1"/>
-          </p:cNvSpPr>
-          <p:nvPr>
-            <p:ph type="body" sz="quarter" idx="14"/>
-          </p:nvPr>
-        </p:nvSpPr>
-        <p:spPr>
-          <a:xfrm>
-            <a:off x="851300" y="1764193"/>
-            <a:ext cx="3327366" cy="597604"/>
+            <a:off x="647698" y="484494"/>
+            <a:ext cx="5800867" cy="1569493"/>
           </a:xfrm>
         </p:spPr>
         <p:txBody>
@@ -11540,81 +11507,31 @@
           <a:p>
             <a:r>
               <a:rPr lang="en-US" dirty="0"/>
-              <a:t>Subtitle</a:t>
-            </a:r>
-          </a:p>
-        </p:txBody>
-      </p:sp>
-      <p:sp>
-        <p:nvSpPr>
-          <p:cNvPr id="11" name="Content Placeholder 10">
-            <a:extLst>
-              <a:ext uri="{FF2B5EF4-FFF2-40B4-BE49-F238E27FC236}">
-                <a16:creationId xmlns:a16="http://schemas.microsoft.com/office/drawing/2014/main" id="{DFFE8322-74A2-43C3-B71A-8DD6B2DC0DF8}"/>
-              </a:ext>
-            </a:extLst>
-          </p:cNvPr>
-          <p:cNvSpPr>
-            <a:spLocks noGrp="1"/>
-          </p:cNvSpPr>
-          <p:nvPr>
-            <p:ph type="body" sz="quarter" idx="19"/>
-          </p:nvPr>
-        </p:nvSpPr>
-        <p:spPr>
-          <a:xfrm>
-            <a:off x="851193" y="2374899"/>
-            <a:ext cx="3327366" cy="3485573"/>
-          </a:xfrm>
-        </p:spPr>
-        <p:txBody>
-          <a:bodyPr>
-            <a:normAutofit/>
-          </a:bodyPr>
-          <a:lstStyle/>
-          <a:p>
-            <a:pPr lvl="0"/>
-            <a:r>
-              <a:rPr lang="en-US" dirty="0"/>
-              <a:t>Add text, images, art, and videos. </a:t>
-            </a:r>
-          </a:p>
-          <a:p>
-            <a:pPr lvl="0"/>
-            <a:r>
-              <a:rPr lang="en-US" dirty="0"/>
-              <a:t>Add transitions, animations, and motion. </a:t>
-            </a:r>
-          </a:p>
-          <a:p>
-            <a:pPr lvl="0"/>
-            <a:r>
-              <a:rPr lang="en-US" dirty="0"/>
-              <a:t>Save to OneDrive, to get to your presentations from your computer, tablet, or phone. </a:t>
-            </a:r>
-          </a:p>
-        </p:txBody>
-      </p:sp>
-      <p:sp>
-        <p:nvSpPr>
-          <p:cNvPr id="16" name="Text Placeholder 15">
-            <a:extLst>
-              <a:ext uri="{FF2B5EF4-FFF2-40B4-BE49-F238E27FC236}">
-                <a16:creationId xmlns:a16="http://schemas.microsoft.com/office/drawing/2014/main" id="{88417E53-E35C-4BA6-B238-61D2C004A237}"/>
-              </a:ext>
-            </a:extLst>
-          </p:cNvPr>
-          <p:cNvSpPr>
-            <a:spLocks noGrp="1"/>
-          </p:cNvSpPr>
-          <p:nvPr>
-            <p:ph type="body" sz="quarter" idx="18"/>
-          </p:nvPr>
-        </p:nvSpPr>
-        <p:spPr>
-          <a:xfrm>
-            <a:off x="4432317" y="1764193"/>
-            <a:ext cx="3327366" cy="597604"/>
+              <a:t>Summary</a:t>
+            </a:r>
+          </a:p>
+        </p:txBody>
+      </p:sp>
+      <p:sp>
+        <p:nvSpPr>
+          <p:cNvPr id="10" name="Content Placeholder 9">
+            <a:extLst>
+              <a:ext uri="{FF2B5EF4-FFF2-40B4-BE49-F238E27FC236}">
+                <a16:creationId xmlns:a16="http://schemas.microsoft.com/office/drawing/2014/main" id="{C69C1BDB-253B-4642-94A7-F84048E562F7}"/>
+              </a:ext>
+            </a:extLst>
+          </p:cNvPr>
+          <p:cNvSpPr>
+            <a:spLocks noGrp="1"/>
+          </p:cNvSpPr>
+          <p:nvPr>
+            <p:ph idx="1"/>
+          </p:nvPr>
+        </p:nvSpPr>
+        <p:spPr>
+          <a:xfrm>
+            <a:off x="647702" y="2156346"/>
+            <a:ext cx="5800866" cy="3963937"/>
           </a:xfrm>
         </p:spPr>
         <p:txBody>
@@ -11623,146 +11540,65 @@
           <a:p>
             <a:r>
               <a:rPr lang="en-US" dirty="0"/>
-              <a:t>Subtitle</a:t>
-            </a:r>
-          </a:p>
-        </p:txBody>
-      </p:sp>
-      <p:sp>
-        <p:nvSpPr>
-          <p:cNvPr id="13" name="Content Placeholder 12">
-            <a:extLst>
-              <a:ext uri="{FF2B5EF4-FFF2-40B4-BE49-F238E27FC236}">
-                <a16:creationId xmlns:a16="http://schemas.microsoft.com/office/drawing/2014/main" id="{32AA922F-7FCE-49A0-92E0-60263B0E006A}"/>
-              </a:ext>
-            </a:extLst>
-          </p:cNvPr>
-          <p:cNvSpPr>
-            <a:spLocks noGrp="1"/>
-          </p:cNvSpPr>
-          <p:nvPr>
-            <p:ph type="body" sz="quarter" idx="20"/>
-          </p:nvPr>
-        </p:nvSpPr>
-        <p:spPr>
-          <a:xfrm>
-            <a:off x="4432317" y="2374899"/>
-            <a:ext cx="3327366" cy="3485573"/>
-          </a:xfrm>
-        </p:spPr>
-        <p:txBody>
-          <a:bodyPr>
-            <a:normAutofit/>
-          </a:bodyPr>
-          <a:lstStyle/>
-          <a:p>
-            <a:r>
-              <a:rPr lang="en-US" dirty="0"/>
-              <a:t>This PowerPoint theme uses its own unique set of colors, fonts, and effects to create the overall look and feel of these slides. </a:t>
-            </a:r>
-          </a:p>
-          <a:p>
-            <a:r>
-              <a:rPr lang="en-US" dirty="0"/>
-              <a:t>PowerPoint has tons of themes to give your presentation just the right personality. </a:t>
-            </a:r>
-          </a:p>
-        </p:txBody>
-      </p:sp>
-      <p:sp>
-        <p:nvSpPr>
-          <p:cNvPr id="14" name="Text Placeholder 13">
-            <a:extLst>
-              <a:ext uri="{FF2B5EF4-FFF2-40B4-BE49-F238E27FC236}">
-                <a16:creationId xmlns:a16="http://schemas.microsoft.com/office/drawing/2014/main" id="{94D68F73-4FB1-4145-BF89-FE36142E5100}"/>
-              </a:ext>
-            </a:extLst>
-          </p:cNvPr>
-          <p:cNvSpPr>
-            <a:spLocks noGrp="1"/>
-          </p:cNvSpPr>
-          <p:nvPr>
-            <p:ph type="body" sz="quarter" idx="16"/>
-          </p:nvPr>
-        </p:nvSpPr>
-        <p:spPr>
-          <a:xfrm>
-            <a:off x="8025393" y="1764193"/>
-            <a:ext cx="3327366" cy="597604"/>
+              <a:t>With PowerPoint, you can create presentations and share your work with others, wherever they are. Type the text you want here to get started. You can also add images, art, and videos on this template. Save to OneDrive and access your presentations from your computer, tablet, or phone. </a:t>
+            </a:r>
+          </a:p>
+        </p:txBody>
+      </p:sp>
+      <p:sp>
+        <p:nvSpPr>
+          <p:cNvPr id="16" name="Footer Placeholder 15">
+            <a:extLst>
+              <a:ext uri="{FF2B5EF4-FFF2-40B4-BE49-F238E27FC236}">
+                <a16:creationId xmlns:a16="http://schemas.microsoft.com/office/drawing/2014/main" id="{C394FA6A-80EA-46C1-8A4C-B4D8E90A7BCE}"/>
+              </a:ext>
+            </a:extLst>
+          </p:cNvPr>
+          <p:cNvSpPr>
+            <a:spLocks noGrp="1"/>
+          </p:cNvSpPr>
+          <p:nvPr>
+            <p:ph type="ftr" sz="quarter" idx="11"/>
+          </p:nvPr>
+        </p:nvSpPr>
+        <p:spPr>
+          <a:xfrm>
+            <a:off x="199277" y="6356350"/>
+            <a:ext cx="3877423" cy="365125"/>
           </a:xfrm>
         </p:spPr>
         <p:txBody>
           <a:bodyPr/>
           <a:lstStyle/>
           <a:p>
-            <a:r>
-              <a:rPr lang="en-US" dirty="0"/>
-              <a:t>Subtitle</a:t>
-            </a:r>
-          </a:p>
-        </p:txBody>
-      </p:sp>
-      <p:sp>
-        <p:nvSpPr>
-          <p:cNvPr id="15" name="Content Placeholder 14">
-            <a:extLst>
-              <a:ext uri="{FF2B5EF4-FFF2-40B4-BE49-F238E27FC236}">
-                <a16:creationId xmlns:a16="http://schemas.microsoft.com/office/drawing/2014/main" id="{967F3EB6-BBF7-400D-831B-2949763446D0}"/>
-              </a:ext>
-            </a:extLst>
-          </p:cNvPr>
-          <p:cNvSpPr>
-            <a:spLocks noGrp="1"/>
-          </p:cNvSpPr>
-          <p:nvPr>
-            <p:ph type="body" sz="quarter" idx="21"/>
-          </p:nvPr>
-        </p:nvSpPr>
-        <p:spPr>
-          <a:xfrm>
-            <a:off x="8025393" y="2374899"/>
-            <a:ext cx="3327366" cy="3485573"/>
-          </a:xfrm>
-        </p:spPr>
-        <p:txBody>
-          <a:bodyPr>
-            <a:normAutofit/>
-          </a:bodyPr>
-          <a:lstStyle/>
-          <a:p>
-            <a:r>
-              <a:rPr lang="en-US" dirty="0"/>
-              <a:t>Open the Design Ideas pane for instant slide makeovers. </a:t>
-            </a:r>
-          </a:p>
-          <a:p>
-            <a:r>
-              <a:rPr lang="en-US" dirty="0"/>
-              <a:t>When we have design ideas, we’ll show them to you right there.</a:t>
-            </a:r>
-          </a:p>
-        </p:txBody>
-      </p:sp>
-      <p:sp>
-        <p:nvSpPr>
-          <p:cNvPr id="2" name="Footer Placeholder 1">
-            <a:extLst>
-              <a:ext uri="{FF2B5EF4-FFF2-40B4-BE49-F238E27FC236}">
-                <a16:creationId xmlns:a16="http://schemas.microsoft.com/office/drawing/2014/main" id="{2C20C49D-5E38-4E7C-A240-4B2D015F3AC7}"/>
-              </a:ext>
-            </a:extLst>
-          </p:cNvPr>
-          <p:cNvSpPr>
-            <a:spLocks noGrp="1"/>
-          </p:cNvSpPr>
-          <p:nvPr>
-            <p:ph type="ftr" sz="quarter" idx="11"/>
-          </p:nvPr>
-        </p:nvSpPr>
-        <p:spPr>
-          <a:xfrm>
-            <a:off x="201168" y="6356350"/>
-            <a:ext cx="4837176" cy="365125"/>
+            <a:pPr lvl="0"/>
+            <a:r>
+              <a:rPr lang="en-US" noProof="0" dirty="0"/>
+              <a:t>Presentation title</a:t>
+            </a:r>
+          </a:p>
+        </p:txBody>
+      </p:sp>
+      <p:sp>
+        <p:nvSpPr>
+          <p:cNvPr id="15" name="Date Placeholder 14">
+            <a:extLst>
+              <a:ext uri="{FF2B5EF4-FFF2-40B4-BE49-F238E27FC236}">
+                <a16:creationId xmlns:a16="http://schemas.microsoft.com/office/drawing/2014/main" id="{1AEB8108-A042-4614-9BE5-EA75E8653D79}"/>
+              </a:ext>
+            </a:extLst>
+          </p:cNvPr>
+          <p:cNvSpPr>
+            <a:spLocks noGrp="1"/>
+          </p:cNvSpPr>
+          <p:nvPr>
+            <p:ph type="dt" sz="half" idx="10"/>
+          </p:nvPr>
+        </p:nvSpPr>
+        <p:spPr>
+          <a:xfrm>
+            <a:off x="7013448" y="6355080"/>
+            <a:ext cx="4352544" cy="365125"/>
           </a:xfrm>
         </p:spPr>
         <p:txBody>
@@ -11772,31 +11608,31 @@
             <a:pPr lvl="0"/>
             <a:r>
               <a:rPr lang="en-US" noProof="0" dirty="0"/>
-              <a:t>Presentation title</a:t>
-            </a:r>
-          </a:p>
-        </p:txBody>
-      </p:sp>
-      <p:sp>
-        <p:nvSpPr>
-          <p:cNvPr id="3" name="Date Placeholder 2">
-            <a:extLst>
-              <a:ext uri="{FF2B5EF4-FFF2-40B4-BE49-F238E27FC236}">
-                <a16:creationId xmlns:a16="http://schemas.microsoft.com/office/drawing/2014/main" id="{9CE6D34A-9686-45B2-97D0-AD20167B2D54}"/>
-              </a:ext>
-            </a:extLst>
-          </p:cNvPr>
-          <p:cNvSpPr>
-            <a:spLocks noGrp="1"/>
-          </p:cNvSpPr>
-          <p:nvPr>
-            <p:ph type="dt" sz="half" idx="10"/>
-          </p:nvPr>
-        </p:nvSpPr>
-        <p:spPr>
-          <a:xfrm>
-            <a:off x="7013448" y="6355080"/>
-            <a:ext cx="4352544" cy="365125"/>
+              <a:t>20XX</a:t>
+            </a:r>
+          </a:p>
+        </p:txBody>
+      </p:sp>
+      <p:sp>
+        <p:nvSpPr>
+          <p:cNvPr id="17" name="Slide Number Placeholder 16">
+            <a:extLst>
+              <a:ext uri="{FF2B5EF4-FFF2-40B4-BE49-F238E27FC236}">
+                <a16:creationId xmlns:a16="http://schemas.microsoft.com/office/drawing/2014/main" id="{3F88522D-FC32-4BD0-B916-ED439025B734}"/>
+              </a:ext>
+            </a:extLst>
+          </p:cNvPr>
+          <p:cNvSpPr>
+            <a:spLocks noGrp="1"/>
+          </p:cNvSpPr>
+          <p:nvPr>
+            <p:ph type="sldNum" sz="quarter" idx="12"/>
+          </p:nvPr>
+        </p:nvSpPr>
+        <p:spPr>
+          <a:xfrm>
+            <a:off x="11365992" y="6356350"/>
+            <a:ext cx="630936" cy="365125"/>
           </a:xfrm>
         </p:spPr>
         <p:txBody>
@@ -11804,41 +11640,7 @@
           <a:lstStyle/>
           <a:p>
             <a:pPr lvl="0"/>
-            <a:r>
-              <a:rPr lang="en-US" noProof="0" dirty="0"/>
-              <a:t>20XX</a:t>
-            </a:r>
-          </a:p>
-        </p:txBody>
-      </p:sp>
-      <p:sp>
-        <p:nvSpPr>
-          <p:cNvPr id="4" name="Slide Number Placeholder 3">
-            <a:extLst>
-              <a:ext uri="{FF2B5EF4-FFF2-40B4-BE49-F238E27FC236}">
-                <a16:creationId xmlns:a16="http://schemas.microsoft.com/office/drawing/2014/main" id="{AC0EC6D8-4D66-4B16-AD3F-2850D613518A}"/>
-              </a:ext>
-            </a:extLst>
-          </p:cNvPr>
-          <p:cNvSpPr>
-            <a:spLocks noGrp="1"/>
-          </p:cNvSpPr>
-          <p:nvPr>
-            <p:ph type="sldNum" sz="quarter" idx="12"/>
-          </p:nvPr>
-        </p:nvSpPr>
-        <p:spPr>
-          <a:xfrm>
-            <a:off x="11365992" y="6356350"/>
-            <a:ext cx="630936" cy="365125"/>
-          </a:xfrm>
-        </p:spPr>
-        <p:txBody>
-          <a:bodyPr/>
-          <a:lstStyle/>
-          <a:p>
-            <a:pPr lvl="0"/>
-            <a:fld id="{06B786C7-B8F9-4072-AAAA-17258464D730}" type="slidenum">
+            <a:fld id="{D39F39FF-F5CB-4ACA-9B46-4CCF89ECA75F}" type="slidenum">
               <a:rPr lang="en-US" noProof="0" smtClean="0"/>
               <a:pPr lvl="0"/>
               <a:t>12</a:t>
@@ -11847,10 +11649,82 @@
           </a:p>
         </p:txBody>
       </p:sp>
+      <p:sp>
+        <p:nvSpPr>
+          <p:cNvPr id="3" name="Picture Placeholder 2">
+            <a:extLst>
+              <a:ext uri="{FF2B5EF4-FFF2-40B4-BE49-F238E27FC236}">
+                <a16:creationId xmlns:a16="http://schemas.microsoft.com/office/drawing/2014/main" id="{C6FAE7B3-1967-78AC-A10D-3F1ACD0964CD}"/>
+              </a:ext>
+            </a:extLst>
+          </p:cNvPr>
+          <p:cNvSpPr>
+            <a:spLocks noGrp="1"/>
+          </p:cNvSpPr>
+          <p:nvPr>
+            <p:ph type="pic" sz="quarter" idx="13"/>
+          </p:nvPr>
+        </p:nvSpPr>
+        <p:spPr/>
+      </p:sp>
+      <p:sp>
+        <p:nvSpPr>
+          <p:cNvPr id="5" name="Picture Placeholder 4">
+            <a:extLst>
+              <a:ext uri="{FF2B5EF4-FFF2-40B4-BE49-F238E27FC236}">
+                <a16:creationId xmlns:a16="http://schemas.microsoft.com/office/drawing/2014/main" id="{79E5EC71-96FE-8345-7BCA-B238709C79E0}"/>
+              </a:ext>
+            </a:extLst>
+          </p:cNvPr>
+          <p:cNvSpPr>
+            <a:spLocks noGrp="1"/>
+          </p:cNvSpPr>
+          <p:nvPr>
+            <p:ph type="pic" sz="quarter" idx="14"/>
+          </p:nvPr>
+        </p:nvSpPr>
+        <p:spPr/>
+      </p:sp>
+      <p:sp>
+        <p:nvSpPr>
+          <p:cNvPr id="7" name="Picture Placeholder 6">
+            <a:extLst>
+              <a:ext uri="{FF2B5EF4-FFF2-40B4-BE49-F238E27FC236}">
+                <a16:creationId xmlns:a16="http://schemas.microsoft.com/office/drawing/2014/main" id="{664B8B6A-8720-A1C2-5E16-C112646DE0F2}"/>
+              </a:ext>
+            </a:extLst>
+          </p:cNvPr>
+          <p:cNvSpPr>
+            <a:spLocks noGrp="1"/>
+          </p:cNvSpPr>
+          <p:nvPr>
+            <p:ph type="pic" sz="quarter" idx="15"/>
+          </p:nvPr>
+        </p:nvSpPr>
+        <p:spPr/>
+      </p:sp>
+      <p:sp>
+        <p:nvSpPr>
+          <p:cNvPr id="11" name="Picture Placeholder 10">
+            <a:extLst>
+              <a:ext uri="{FF2B5EF4-FFF2-40B4-BE49-F238E27FC236}">
+                <a16:creationId xmlns:a16="http://schemas.microsoft.com/office/drawing/2014/main" id="{528D2816-C01E-47BD-7048-3769B46D1460}"/>
+              </a:ext>
+            </a:extLst>
+          </p:cNvPr>
+          <p:cNvSpPr>
+            <a:spLocks noGrp="1"/>
+          </p:cNvSpPr>
+          <p:nvPr>
+            <p:ph type="pic" sz="quarter" idx="16"/>
+          </p:nvPr>
+        </p:nvSpPr>
+        <p:spPr/>
+      </p:sp>
     </p:spTree>
     <p:extLst>
       <p:ext uri="{BB962C8B-B14F-4D97-AF65-F5344CB8AC3E}">
-        <p14:creationId xmlns:p14="http://schemas.microsoft.com/office/powerpoint/2010/main" val="338249949"/>
+        <p14:creationId xmlns:p14="http://schemas.microsoft.com/office/powerpoint/2010/main" val="4039808263"/>
       </p:ext>
     </p:extLst>
   </p:cSld>
@@ -11879,24 +11753,24 @@
       </p:grpSpPr>
       <p:sp>
         <p:nvSpPr>
-          <p:cNvPr id="9" name="Title 8">
-            <a:extLst>
-              <a:ext uri="{FF2B5EF4-FFF2-40B4-BE49-F238E27FC236}">
-                <a16:creationId xmlns:a16="http://schemas.microsoft.com/office/drawing/2014/main" id="{9A92E93D-8BFB-4A21-A47E-78B6DCA21146}"/>
-              </a:ext>
-            </a:extLst>
-          </p:cNvPr>
-          <p:cNvSpPr>
-            <a:spLocks noGrp="1"/>
-          </p:cNvSpPr>
-          <p:nvPr>
-            <p:ph type="title"/>
-          </p:nvPr>
-        </p:nvSpPr>
-        <p:spPr>
-          <a:xfrm>
-            <a:off x="647698" y="484494"/>
-            <a:ext cx="5800867" cy="1569493"/>
+          <p:cNvPr id="32" name="Title 31">
+            <a:extLst>
+              <a:ext uri="{FF2B5EF4-FFF2-40B4-BE49-F238E27FC236}">
+                <a16:creationId xmlns:a16="http://schemas.microsoft.com/office/drawing/2014/main" id="{30761B21-88ED-449E-B2B9-3FC40844C36D}"/>
+              </a:ext>
+            </a:extLst>
+          </p:cNvPr>
+          <p:cNvSpPr>
+            <a:spLocks noGrp="1"/>
+          </p:cNvSpPr>
+          <p:nvPr>
+            <p:ph type="ctrTitle"/>
+          </p:nvPr>
+        </p:nvSpPr>
+        <p:spPr>
+          <a:xfrm>
+            <a:off x="877001" y="4947313"/>
+            <a:ext cx="7700617" cy="1409037"/>
           </a:xfrm>
         </p:spPr>
         <p:txBody>
@@ -11905,31 +11779,31 @@
           <a:p>
             <a:r>
               <a:rPr lang="en-US" dirty="0"/>
-              <a:t>Summary</a:t>
-            </a:r>
-          </a:p>
-        </p:txBody>
-      </p:sp>
-      <p:sp>
-        <p:nvSpPr>
-          <p:cNvPr id="10" name="Content Placeholder 9">
-            <a:extLst>
-              <a:ext uri="{FF2B5EF4-FFF2-40B4-BE49-F238E27FC236}">
-                <a16:creationId xmlns:a16="http://schemas.microsoft.com/office/drawing/2014/main" id="{C69C1BDB-253B-4642-94A7-F84048E562F7}"/>
-              </a:ext>
-            </a:extLst>
-          </p:cNvPr>
-          <p:cNvSpPr>
-            <a:spLocks noGrp="1"/>
-          </p:cNvSpPr>
-          <p:nvPr>
-            <p:ph idx="1"/>
-          </p:nvPr>
-        </p:nvSpPr>
-        <p:spPr>
-          <a:xfrm>
-            <a:off x="647702" y="2156346"/>
-            <a:ext cx="5800866" cy="3963937"/>
+              <a:t>Thank you</a:t>
+            </a:r>
+          </a:p>
+        </p:txBody>
+      </p:sp>
+      <p:sp>
+        <p:nvSpPr>
+          <p:cNvPr id="33" name="Subtitle 32">
+            <a:extLst>
+              <a:ext uri="{FF2B5EF4-FFF2-40B4-BE49-F238E27FC236}">
+                <a16:creationId xmlns:a16="http://schemas.microsoft.com/office/drawing/2014/main" id="{0EEAA874-288B-4330-9FA4-F1144ACD46DE}"/>
+              </a:ext>
+            </a:extLst>
+          </p:cNvPr>
+          <p:cNvSpPr>
+            <a:spLocks noGrp="1"/>
+          </p:cNvSpPr>
+          <p:nvPr>
+            <p:ph type="subTitle" idx="1"/>
+          </p:nvPr>
+        </p:nvSpPr>
+        <p:spPr>
+          <a:xfrm>
+            <a:off x="9446252" y="386989"/>
+            <a:ext cx="2443495" cy="3758334"/>
           </a:xfrm>
         </p:spPr>
         <p:txBody>
@@ -11938,17 +11812,35 @@
           <a:p>
             <a:r>
               <a:rPr lang="en-US" dirty="0"/>
-              <a:t>With PowerPoint, you can create presentations and share your work with others, wherever they are. Type the text you want here to get started. You can also add images, art, and videos on this template. Save to OneDrive and access your presentations from your computer, tablet, or phone. </a:t>
-            </a:r>
-          </a:p>
-        </p:txBody>
-      </p:sp>
-      <p:sp>
-        <p:nvSpPr>
-          <p:cNvPr id="16" name="Footer Placeholder 15">
-            <a:extLst>
-              <a:ext uri="{FF2B5EF4-FFF2-40B4-BE49-F238E27FC236}">
-                <a16:creationId xmlns:a16="http://schemas.microsoft.com/office/drawing/2014/main" id="{C394FA6A-80EA-46C1-8A4C-B4D8E90A7BCE}"/>
+              <a:t>Presenter name</a:t>
+            </a:r>
+          </a:p>
+          <a:p>
+            <a:endParaRPr lang="en-US" dirty="0"/>
+          </a:p>
+          <a:p>
+            <a:r>
+              <a:rPr lang="en-US" dirty="0"/>
+              <a:t>Email address</a:t>
+            </a:r>
+          </a:p>
+          <a:p>
+            <a:endParaRPr lang="en-US" dirty="0"/>
+          </a:p>
+          <a:p>
+            <a:r>
+              <a:rPr lang="en-US" dirty="0"/>
+              <a:t>Website</a:t>
+            </a:r>
+          </a:p>
+        </p:txBody>
+      </p:sp>
+      <p:sp>
+        <p:nvSpPr>
+          <p:cNvPr id="4" name="Footer Placeholder 3">
+            <a:extLst>
+              <a:ext uri="{FF2B5EF4-FFF2-40B4-BE49-F238E27FC236}">
+                <a16:creationId xmlns:a16="http://schemas.microsoft.com/office/drawing/2014/main" id="{BBA09E0B-CEBC-425D-8A86-1F858D8DE9AD}"/>
               </a:ext>
             </a:extLst>
           </p:cNvPr>
@@ -11961,8 +11853,8 @@
         </p:nvSpPr>
         <p:spPr>
           <a:xfrm>
-            <a:off x="199277" y="6356350"/>
-            <a:ext cx="3877423" cy="365125"/>
+            <a:off x="201168" y="6356350"/>
+            <a:ext cx="4837176" cy="365125"/>
           </a:xfrm>
         </p:spPr>
         <p:txBody>
@@ -11979,10 +11871,10 @@
       </p:sp>
       <p:sp>
         <p:nvSpPr>
-          <p:cNvPr id="15" name="Date Placeholder 14">
-            <a:extLst>
-              <a:ext uri="{FF2B5EF4-FFF2-40B4-BE49-F238E27FC236}">
-                <a16:creationId xmlns:a16="http://schemas.microsoft.com/office/drawing/2014/main" id="{1AEB8108-A042-4614-9BE5-EA75E8653D79}"/>
+          <p:cNvPr id="5" name="Date Placeholder 4">
+            <a:extLst>
+              <a:ext uri="{FF2B5EF4-FFF2-40B4-BE49-F238E27FC236}">
+                <a16:creationId xmlns:a16="http://schemas.microsoft.com/office/drawing/2014/main" id="{4DBAEA19-91BF-48E8-A1D4-8FB745EA44D0}"/>
               </a:ext>
             </a:extLst>
           </p:cNvPr>
@@ -12013,10 +11905,10 @@
       </p:sp>
       <p:sp>
         <p:nvSpPr>
-          <p:cNvPr id="17" name="Slide Number Placeholder 16">
-            <a:extLst>
-              <a:ext uri="{FF2B5EF4-FFF2-40B4-BE49-F238E27FC236}">
-                <a16:creationId xmlns:a16="http://schemas.microsoft.com/office/drawing/2014/main" id="{3F88522D-FC32-4BD0-B916-ED439025B734}"/>
+          <p:cNvPr id="6" name="Slide Number Placeholder 5">
+            <a:extLst>
+              <a:ext uri="{FF2B5EF4-FFF2-40B4-BE49-F238E27FC236}">
+                <a16:creationId xmlns:a16="http://schemas.microsoft.com/office/drawing/2014/main" id="{9E887279-B48F-43C3-91FA-09BD7EA33A25}"/>
               </a:ext>
             </a:extLst>
           </p:cNvPr>
@@ -12042,296 +11934,6 @@
               <a:rPr lang="en-US" noProof="0" smtClean="0"/>
               <a:pPr lvl="0"/>
               <a:t>13</a:t>
-            </a:fld>
-            <a:endParaRPr lang="en-US" noProof="0" dirty="0"/>
-          </a:p>
-        </p:txBody>
-      </p:sp>
-      <p:sp>
-        <p:nvSpPr>
-          <p:cNvPr id="3" name="Picture Placeholder 2">
-            <a:extLst>
-              <a:ext uri="{FF2B5EF4-FFF2-40B4-BE49-F238E27FC236}">
-                <a16:creationId xmlns:a16="http://schemas.microsoft.com/office/drawing/2014/main" id="{C6FAE7B3-1967-78AC-A10D-3F1ACD0964CD}"/>
-              </a:ext>
-            </a:extLst>
-          </p:cNvPr>
-          <p:cNvSpPr>
-            <a:spLocks noGrp="1"/>
-          </p:cNvSpPr>
-          <p:nvPr>
-            <p:ph type="pic" sz="quarter" idx="13"/>
-          </p:nvPr>
-        </p:nvSpPr>
-        <p:spPr/>
-      </p:sp>
-      <p:sp>
-        <p:nvSpPr>
-          <p:cNvPr id="5" name="Picture Placeholder 4">
-            <a:extLst>
-              <a:ext uri="{FF2B5EF4-FFF2-40B4-BE49-F238E27FC236}">
-                <a16:creationId xmlns:a16="http://schemas.microsoft.com/office/drawing/2014/main" id="{79E5EC71-96FE-8345-7BCA-B238709C79E0}"/>
-              </a:ext>
-            </a:extLst>
-          </p:cNvPr>
-          <p:cNvSpPr>
-            <a:spLocks noGrp="1"/>
-          </p:cNvSpPr>
-          <p:nvPr>
-            <p:ph type="pic" sz="quarter" idx="14"/>
-          </p:nvPr>
-        </p:nvSpPr>
-        <p:spPr/>
-      </p:sp>
-      <p:sp>
-        <p:nvSpPr>
-          <p:cNvPr id="7" name="Picture Placeholder 6">
-            <a:extLst>
-              <a:ext uri="{FF2B5EF4-FFF2-40B4-BE49-F238E27FC236}">
-                <a16:creationId xmlns:a16="http://schemas.microsoft.com/office/drawing/2014/main" id="{664B8B6A-8720-A1C2-5E16-C112646DE0F2}"/>
-              </a:ext>
-            </a:extLst>
-          </p:cNvPr>
-          <p:cNvSpPr>
-            <a:spLocks noGrp="1"/>
-          </p:cNvSpPr>
-          <p:nvPr>
-            <p:ph type="pic" sz="quarter" idx="15"/>
-          </p:nvPr>
-        </p:nvSpPr>
-        <p:spPr/>
-      </p:sp>
-      <p:sp>
-        <p:nvSpPr>
-          <p:cNvPr id="11" name="Picture Placeholder 10">
-            <a:extLst>
-              <a:ext uri="{FF2B5EF4-FFF2-40B4-BE49-F238E27FC236}">
-                <a16:creationId xmlns:a16="http://schemas.microsoft.com/office/drawing/2014/main" id="{528D2816-C01E-47BD-7048-3769B46D1460}"/>
-              </a:ext>
-            </a:extLst>
-          </p:cNvPr>
-          <p:cNvSpPr>
-            <a:spLocks noGrp="1"/>
-          </p:cNvSpPr>
-          <p:nvPr>
-            <p:ph type="pic" sz="quarter" idx="16"/>
-          </p:nvPr>
-        </p:nvSpPr>
-        <p:spPr/>
-      </p:sp>
-    </p:spTree>
-    <p:extLst>
-      <p:ext uri="{BB962C8B-B14F-4D97-AF65-F5344CB8AC3E}">
-        <p14:creationId xmlns:p14="http://schemas.microsoft.com/office/powerpoint/2010/main" val="4039808263"/>
-      </p:ext>
-    </p:extLst>
-  </p:cSld>
-  <p:clrMapOvr>
-    <a:masterClrMapping/>
-  </p:clrMapOvr>
-</p:sld>
-</file>
-
-<file path=ppt/slides/slide14.xml><?xml version="1.0" encoding="utf-8"?>
-<p:sld xmlns:a="http://schemas.openxmlformats.org/drawingml/2006/main" xmlns:r="http://schemas.openxmlformats.org/officeDocument/2006/relationships" xmlns:p="http://schemas.openxmlformats.org/presentationml/2006/main">
-  <p:cSld>
-    <p:spTree>
-      <p:nvGrpSpPr>
-        <p:cNvPr id="1" name=""/>
-        <p:cNvGrpSpPr/>
-        <p:nvPr/>
-      </p:nvGrpSpPr>
-      <p:grpSpPr>
-        <a:xfrm>
-          <a:off x="0" y="0"/>
-          <a:ext cx="0" cy="0"/>
-          <a:chOff x="0" y="0"/>
-          <a:chExt cx="0" cy="0"/>
-        </a:xfrm>
-      </p:grpSpPr>
-      <p:sp>
-        <p:nvSpPr>
-          <p:cNvPr id="32" name="Title 31">
-            <a:extLst>
-              <a:ext uri="{FF2B5EF4-FFF2-40B4-BE49-F238E27FC236}">
-                <a16:creationId xmlns:a16="http://schemas.microsoft.com/office/drawing/2014/main" id="{30761B21-88ED-449E-B2B9-3FC40844C36D}"/>
-              </a:ext>
-            </a:extLst>
-          </p:cNvPr>
-          <p:cNvSpPr>
-            <a:spLocks noGrp="1"/>
-          </p:cNvSpPr>
-          <p:nvPr>
-            <p:ph type="ctrTitle"/>
-          </p:nvPr>
-        </p:nvSpPr>
-        <p:spPr>
-          <a:xfrm>
-            <a:off x="877001" y="4947313"/>
-            <a:ext cx="7700617" cy="1409037"/>
-          </a:xfrm>
-        </p:spPr>
-        <p:txBody>
-          <a:bodyPr/>
-          <a:lstStyle/>
-          <a:p>
-            <a:r>
-              <a:rPr lang="en-US" dirty="0"/>
-              <a:t>Thank you</a:t>
-            </a:r>
-          </a:p>
-        </p:txBody>
-      </p:sp>
-      <p:sp>
-        <p:nvSpPr>
-          <p:cNvPr id="33" name="Subtitle 32">
-            <a:extLst>
-              <a:ext uri="{FF2B5EF4-FFF2-40B4-BE49-F238E27FC236}">
-                <a16:creationId xmlns:a16="http://schemas.microsoft.com/office/drawing/2014/main" id="{0EEAA874-288B-4330-9FA4-F1144ACD46DE}"/>
-              </a:ext>
-            </a:extLst>
-          </p:cNvPr>
-          <p:cNvSpPr>
-            <a:spLocks noGrp="1"/>
-          </p:cNvSpPr>
-          <p:nvPr>
-            <p:ph type="subTitle" idx="1"/>
-          </p:nvPr>
-        </p:nvSpPr>
-        <p:spPr>
-          <a:xfrm>
-            <a:off x="9446252" y="386989"/>
-            <a:ext cx="2443495" cy="3758334"/>
-          </a:xfrm>
-        </p:spPr>
-        <p:txBody>
-          <a:bodyPr/>
-          <a:lstStyle/>
-          <a:p>
-            <a:r>
-              <a:rPr lang="en-US" dirty="0"/>
-              <a:t>Presenter name</a:t>
-            </a:r>
-          </a:p>
-          <a:p>
-            <a:endParaRPr lang="en-US" dirty="0"/>
-          </a:p>
-          <a:p>
-            <a:r>
-              <a:rPr lang="en-US" dirty="0"/>
-              <a:t>Email address</a:t>
-            </a:r>
-          </a:p>
-          <a:p>
-            <a:endParaRPr lang="en-US" dirty="0"/>
-          </a:p>
-          <a:p>
-            <a:r>
-              <a:rPr lang="en-US" dirty="0"/>
-              <a:t>Website</a:t>
-            </a:r>
-          </a:p>
-        </p:txBody>
-      </p:sp>
-      <p:sp>
-        <p:nvSpPr>
-          <p:cNvPr id="4" name="Footer Placeholder 3">
-            <a:extLst>
-              <a:ext uri="{FF2B5EF4-FFF2-40B4-BE49-F238E27FC236}">
-                <a16:creationId xmlns:a16="http://schemas.microsoft.com/office/drawing/2014/main" id="{BBA09E0B-CEBC-425D-8A86-1F858D8DE9AD}"/>
-              </a:ext>
-            </a:extLst>
-          </p:cNvPr>
-          <p:cNvSpPr>
-            <a:spLocks noGrp="1"/>
-          </p:cNvSpPr>
-          <p:nvPr>
-            <p:ph type="ftr" sz="quarter" idx="11"/>
-          </p:nvPr>
-        </p:nvSpPr>
-        <p:spPr>
-          <a:xfrm>
-            <a:off x="201168" y="6356350"/>
-            <a:ext cx="4837176" cy="365125"/>
-          </a:xfrm>
-        </p:spPr>
-        <p:txBody>
-          <a:bodyPr/>
-          <a:lstStyle/>
-          <a:p>
-            <a:pPr lvl="0"/>
-            <a:r>
-              <a:rPr lang="en-US" noProof="0" dirty="0"/>
-              <a:t>Presentation title</a:t>
-            </a:r>
-          </a:p>
-        </p:txBody>
-      </p:sp>
-      <p:sp>
-        <p:nvSpPr>
-          <p:cNvPr id="5" name="Date Placeholder 4">
-            <a:extLst>
-              <a:ext uri="{FF2B5EF4-FFF2-40B4-BE49-F238E27FC236}">
-                <a16:creationId xmlns:a16="http://schemas.microsoft.com/office/drawing/2014/main" id="{4DBAEA19-91BF-48E8-A1D4-8FB745EA44D0}"/>
-              </a:ext>
-            </a:extLst>
-          </p:cNvPr>
-          <p:cNvSpPr>
-            <a:spLocks noGrp="1"/>
-          </p:cNvSpPr>
-          <p:nvPr>
-            <p:ph type="dt" sz="half" idx="10"/>
-          </p:nvPr>
-        </p:nvSpPr>
-        <p:spPr>
-          <a:xfrm>
-            <a:off x="7013448" y="6355080"/>
-            <a:ext cx="4352544" cy="365125"/>
-          </a:xfrm>
-        </p:spPr>
-        <p:txBody>
-          <a:bodyPr/>
-          <a:lstStyle/>
-          <a:p>
-            <a:pPr lvl="0"/>
-            <a:r>
-              <a:rPr lang="en-US" noProof="0" dirty="0"/>
-              <a:t>20XX</a:t>
-            </a:r>
-          </a:p>
-        </p:txBody>
-      </p:sp>
-      <p:sp>
-        <p:nvSpPr>
-          <p:cNvPr id="6" name="Slide Number Placeholder 5">
-            <a:extLst>
-              <a:ext uri="{FF2B5EF4-FFF2-40B4-BE49-F238E27FC236}">
-                <a16:creationId xmlns:a16="http://schemas.microsoft.com/office/drawing/2014/main" id="{9E887279-B48F-43C3-91FA-09BD7EA33A25}"/>
-              </a:ext>
-            </a:extLst>
-          </p:cNvPr>
-          <p:cNvSpPr>
-            <a:spLocks noGrp="1"/>
-          </p:cNvSpPr>
-          <p:nvPr>
-            <p:ph type="sldNum" sz="quarter" idx="12"/>
-          </p:nvPr>
-        </p:nvSpPr>
-        <p:spPr>
-          <a:xfrm>
-            <a:off x="11365992" y="6356350"/>
-            <a:ext cx="630936" cy="365125"/>
-          </a:xfrm>
-        </p:spPr>
-        <p:txBody>
-          <a:bodyPr/>
-          <a:lstStyle/>
-          <a:p>
-            <a:pPr lvl="0"/>
-            <a:fld id="{D39F39FF-F5CB-4ACA-9B46-4CCF89ECA75F}" type="slidenum">
-              <a:rPr lang="en-US" noProof="0" smtClean="0"/>
-              <a:pPr lvl="0"/>
-              <a:t>14</a:t>
             </a:fld>
             <a:endParaRPr lang="en-US" noProof="0" dirty="0"/>
           </a:p>
@@ -14453,8 +14055,8 @@
         </p:nvSpPr>
         <p:spPr>
           <a:xfrm>
-            <a:off x="975690" y="1390022"/>
-            <a:ext cx="4344180" cy="4965058"/>
+            <a:off x="949923" y="1572584"/>
+            <a:ext cx="6037756" cy="4965058"/>
           </a:xfrm>
         </p:spPr>
         <p:txBody>
@@ -14477,23 +14079,48 @@
             </a:r>
           </a:p>
           <a:p>
-            <a:r>
-              <a:rPr lang="en-US" dirty="0"/>
-              <a:t>GOAL:</a:t>
-            </a:r>
-          </a:p>
-          <a:p>
+            <a:pPr marL="342900" indent="-342900">
+              <a:buFont typeface="Arial" panose="020B0604020202020204" pitchFamily="34" charset="0"/>
+              <a:buChar char="•"/>
+            </a:pPr>
             <a:r>
               <a:rPr lang="en-US" b="0" dirty="0">
                 <a:solidFill>
                   <a:schemeClr val="tx1"/>
                 </a:solidFill>
               </a:rPr>
-              <a:t>Use reduced feature space to predict multi-target hitter &amp; pitcher performance</a:t>
-            </a:r>
-          </a:p>
-          <a:p>
-            <a:endParaRPr lang="en-US" dirty="0"/>
+              <a:t>We wish to avoid models that perform best with a larger training set, if possible</a:t>
+            </a:r>
+          </a:p>
+          <a:p>
+            <a:pPr marL="342900" indent="-342900">
+              <a:buFont typeface="Arial" panose="020B0604020202020204" pitchFamily="34" charset="0"/>
+              <a:buChar char="•"/>
+            </a:pPr>
+            <a:r>
+              <a:rPr lang="en-US" b="0" dirty="0">
+                <a:solidFill>
+                  <a:schemeClr val="tx1"/>
+                </a:solidFill>
+              </a:rPr>
+              <a:t>We </a:t>
+            </a:r>
+            <a:r>
+              <a:rPr lang="en-US" dirty="0">
+                <a:solidFill>
+                  <a:schemeClr val="tx1"/>
+                </a:solidFill>
+              </a:rPr>
+              <a:t>need </a:t>
+            </a:r>
+            <a:r>
+              <a:rPr lang="en-US" b="0" dirty="0">
+                <a:solidFill>
+                  <a:schemeClr val="tx1"/>
+                </a:solidFill>
+              </a:rPr>
+              <a:t>a model that can perform multi-target regression (SVM/SVR, decision trees, MLP)</a:t>
+            </a:r>
           </a:p>
         </p:txBody>
       </p:sp>
@@ -16770,6 +16397,15 @@
 </file>
 
 <file path=customXml/item1.xml><?xml version="1.0" encoding="utf-8"?>
+<?mso-contentType ?>
+<FormTemplates xmlns="http://schemas.microsoft.com/sharepoint/v3/contenttype/forms">
+  <Display>DocumentLibraryForm</Display>
+  <Edit>DocumentLibraryForm</Edit>
+  <New>DocumentLibraryForm</New>
+</FormTemplates>
+</file>
+
+<file path=customXml/item2.xml><?xml version="1.0" encoding="utf-8"?>
 <p:properties xmlns:p="http://schemas.microsoft.com/office/2006/metadata/properties" xmlns:xsi="http://www.w3.org/2001/XMLSchema-instance" xmlns:pc="http://schemas.microsoft.com/office/infopath/2007/PartnerControls">
   <documentManagement>
     <Status xmlns="71af3243-3dd4-4a8d-8c0d-dd76da1f02a5">Not started</Status>
@@ -16786,15 +16422,6 @@
     <MediaServiceKeyPoints xmlns="71af3243-3dd4-4a8d-8c0d-dd76da1f02a5" xsi:nil="true"/>
   </documentManagement>
 </p:properties>
-</file>
-
-<file path=customXml/item2.xml><?xml version="1.0" encoding="utf-8"?>
-<?mso-contentType ?>
-<FormTemplates xmlns="http://schemas.microsoft.com/sharepoint/v3/contenttype/forms">
-  <Display>DocumentLibraryForm</Display>
-  <Edit>DocumentLibraryForm</Edit>
-  <New>DocumentLibraryForm</New>
-</FormTemplates>
 </file>
 
 <file path=customXml/item3.xml><?xml version="1.0" encoding="utf-8"?>
@@ -17074,6 +16701,14 @@
 </file>
 
 <file path=customXml/itemProps1.xml><?xml version="1.0" encoding="utf-8"?>
+<ds:datastoreItem xmlns:ds="http://schemas.openxmlformats.org/officeDocument/2006/customXml" ds:itemID="{A5CCB28C-7D26-4A36-9CFC-D739C28F3D18}">
+  <ds:schemaRefs>
+    <ds:schemaRef ds:uri="http://schemas.microsoft.com/sharepoint/v3/contenttype/forms"/>
+  </ds:schemaRefs>
+</ds:datastoreItem>
+</file>
+
+<file path=customXml/itemProps2.xml><?xml version="1.0" encoding="utf-8"?>
 <ds:datastoreItem xmlns:ds="http://schemas.openxmlformats.org/officeDocument/2006/customXml" ds:itemID="{08757C30-AE9A-4680-90EB-19D282EC2B7C}">
   <ds:schemaRefs>
     <ds:schemaRef ds:uri="http://schemas.microsoft.com/office/2006/metadata/properties"/>
@@ -17081,14 +16716,6 @@
     <ds:schemaRef ds:uri="71af3243-3dd4-4a8d-8c0d-dd76da1f02a5"/>
     <ds:schemaRef ds:uri="http://schemas.microsoft.com/sharepoint/v3"/>
     <ds:schemaRef ds:uri="230e9df3-be65-4c73-a93b-d1236ebd677e"/>
-  </ds:schemaRefs>
-</ds:datastoreItem>
-</file>
-
-<file path=customXml/itemProps2.xml><?xml version="1.0" encoding="utf-8"?>
-<ds:datastoreItem xmlns:ds="http://schemas.openxmlformats.org/officeDocument/2006/customXml" ds:itemID="{A5CCB28C-7D26-4A36-9CFC-D739C28F3D18}">
-  <ds:schemaRefs>
-    <ds:schemaRef ds:uri="http://schemas.microsoft.com/sharepoint/v3/contenttype/forms"/>
   </ds:schemaRefs>
 </ds:datastoreItem>
 </file>

</xml_diff>